<commit_message>
Added Decision Trees Notes
</commit_message>
<xml_diff>
--- a/4-Classification Models/Decision Trees/References/C4.5 - Data Preperation.pptx
+++ b/4-Classification Models/Decision Trees/References/C4.5 - Data Preperation.pptx
@@ -14,8 +14,9 @@
     <p:sldId id="264" r:id="rId8"/>
     <p:sldId id="266" r:id="rId9"/>
     <p:sldId id="265" r:id="rId10"/>
-    <p:sldId id="261" r:id="rId11"/>
-    <p:sldId id="262" r:id="rId12"/>
+    <p:sldId id="267" r:id="rId11"/>
+    <p:sldId id="261" r:id="rId12"/>
+    <p:sldId id="262" r:id="rId13"/>
   </p:sldIdLst>
   <p:sldSz cx="12192000" cy="6858000"/>
   <p:notesSz cx="6858000" cy="9144000"/>
@@ -114,6 +115,11 @@
       </a:defRPr>
     </a:lvl9pPr>
   </p:defaultTextStyle>
+  <p:extLst>
+    <p:ext uri="{EFAFB233-063F-42B5-8137-9DF3F51BA10A}">
+      <p15:sldGuideLst xmlns:p15="http://schemas.microsoft.com/office/powerpoint/2012/main"/>
+    </p:ext>
+  </p:extLst>
 </p:presentation>
 </file>
 
@@ -264,7 +270,7 @@
           <a:p>
             <a:fld id="{8D403BFC-6A05-4D08-86B7-E1D4FC04AB19}" type="datetimeFigureOut">
               <a:rPr lang="en-US" smtClean="0"/>
-              <a:t>5/2/2019</a:t>
+              <a:t>5/21/2019</a:t>
             </a:fld>
             <a:endParaRPr lang="en-US"/>
           </a:p>
@@ -462,7 +468,7 @@
           <a:p>
             <a:fld id="{8D403BFC-6A05-4D08-86B7-E1D4FC04AB19}" type="datetimeFigureOut">
               <a:rPr lang="en-US" smtClean="0"/>
-              <a:t>5/2/2019</a:t>
+              <a:t>5/21/2019</a:t>
             </a:fld>
             <a:endParaRPr lang="en-US"/>
           </a:p>
@@ -670,7 +676,7 @@
           <a:p>
             <a:fld id="{8D403BFC-6A05-4D08-86B7-E1D4FC04AB19}" type="datetimeFigureOut">
               <a:rPr lang="en-US" smtClean="0"/>
-              <a:t>5/2/2019</a:t>
+              <a:t>5/21/2019</a:t>
             </a:fld>
             <a:endParaRPr lang="en-US"/>
           </a:p>
@@ -868,7 +874,7 @@
           <a:p>
             <a:fld id="{8D403BFC-6A05-4D08-86B7-E1D4FC04AB19}" type="datetimeFigureOut">
               <a:rPr lang="en-US" smtClean="0"/>
-              <a:t>5/2/2019</a:t>
+              <a:t>5/21/2019</a:t>
             </a:fld>
             <a:endParaRPr lang="en-US"/>
           </a:p>
@@ -1143,7 +1149,7 @@
           <a:p>
             <a:fld id="{8D403BFC-6A05-4D08-86B7-E1D4FC04AB19}" type="datetimeFigureOut">
               <a:rPr lang="en-US" smtClean="0"/>
-              <a:t>5/2/2019</a:t>
+              <a:t>5/21/2019</a:t>
             </a:fld>
             <a:endParaRPr lang="en-US"/>
           </a:p>
@@ -1408,7 +1414,7 @@
           <a:p>
             <a:fld id="{8D403BFC-6A05-4D08-86B7-E1D4FC04AB19}" type="datetimeFigureOut">
               <a:rPr lang="en-US" smtClean="0"/>
-              <a:t>5/2/2019</a:t>
+              <a:t>5/21/2019</a:t>
             </a:fld>
             <a:endParaRPr lang="en-US"/>
           </a:p>
@@ -1820,7 +1826,7 @@
           <a:p>
             <a:fld id="{8D403BFC-6A05-4D08-86B7-E1D4FC04AB19}" type="datetimeFigureOut">
               <a:rPr lang="en-US" smtClean="0"/>
-              <a:t>5/2/2019</a:t>
+              <a:t>5/21/2019</a:t>
             </a:fld>
             <a:endParaRPr lang="en-US"/>
           </a:p>
@@ -1961,7 +1967,7 @@
           <a:p>
             <a:fld id="{8D403BFC-6A05-4D08-86B7-E1D4FC04AB19}" type="datetimeFigureOut">
               <a:rPr lang="en-US" smtClean="0"/>
-              <a:t>5/2/2019</a:t>
+              <a:t>5/21/2019</a:t>
             </a:fld>
             <a:endParaRPr lang="en-US"/>
           </a:p>
@@ -2074,7 +2080,7 @@
           <a:p>
             <a:fld id="{8D403BFC-6A05-4D08-86B7-E1D4FC04AB19}" type="datetimeFigureOut">
               <a:rPr lang="en-US" smtClean="0"/>
-              <a:t>5/2/2019</a:t>
+              <a:t>5/21/2019</a:t>
             </a:fld>
             <a:endParaRPr lang="en-US"/>
           </a:p>
@@ -2385,7 +2391,7 @@
           <a:p>
             <a:fld id="{8D403BFC-6A05-4D08-86B7-E1D4FC04AB19}" type="datetimeFigureOut">
               <a:rPr lang="en-US" smtClean="0"/>
-              <a:t>5/2/2019</a:t>
+              <a:t>5/21/2019</a:t>
             </a:fld>
             <a:endParaRPr lang="en-US"/>
           </a:p>
@@ -2673,7 +2679,7 @@
           <a:p>
             <a:fld id="{8D403BFC-6A05-4D08-86B7-E1D4FC04AB19}" type="datetimeFigureOut">
               <a:rPr lang="en-US" smtClean="0"/>
-              <a:t>5/2/2019</a:t>
+              <a:t>5/21/2019</a:t>
             </a:fld>
             <a:endParaRPr lang="en-US"/>
           </a:p>
@@ -2914,7 +2920,7 @@
           <a:p>
             <a:fld id="{8D403BFC-6A05-4D08-86B7-E1D4FC04AB19}" type="datetimeFigureOut">
               <a:rPr lang="en-US" smtClean="0"/>
-              <a:t>5/2/2019</a:t>
+              <a:t>5/21/2019</a:t>
             </a:fld>
             <a:endParaRPr lang="en-US"/>
           </a:p>
@@ -3614,6 +3620,613 @@
           <a:chExt cx="0" cy="0"/>
         </a:xfrm>
       </p:grpSpPr>
+      <p:sp>
+        <p:nvSpPr>
+          <p:cNvPr id="2" name="Rectangle 1">
+            <a:extLst>
+              <a:ext uri="{FF2B5EF4-FFF2-40B4-BE49-F238E27FC236}">
+                <a16:creationId xmlns:a16="http://schemas.microsoft.com/office/drawing/2014/main" id="{4099CADD-B098-4F3F-B4E7-2847EB3F626D}"/>
+              </a:ext>
+            </a:extLst>
+          </p:cNvPr>
+          <p:cNvSpPr/>
+          <p:nvPr/>
+        </p:nvSpPr>
+        <p:spPr>
+          <a:xfrm>
+            <a:off x="499379" y="282848"/>
+            <a:ext cx="5856540" cy="923330"/>
+          </a:xfrm>
+          <a:prstGeom prst="rect">
+            <a:avLst/>
+          </a:prstGeom>
+          <a:noFill/>
+        </p:spPr>
+        <p:txBody>
+          <a:bodyPr wrap="none" lIns="91440" tIns="45720" rIns="91440" bIns="45720">
+            <a:spAutoFit/>
+          </a:bodyPr>
+          <a:lstStyle/>
+          <a:p>
+            <a:pPr algn="ctr"/>
+            <a:r>
+              <a:rPr lang="en-US" sz="3200" b="0" cap="none" spc="0" dirty="0">
+                <a:ln w="0"/>
+                <a:solidFill>
+                  <a:schemeClr val="tx1"/>
+                </a:solidFill>
+                <a:effectLst>
+                  <a:outerShdw blurRad="38100" dist="19050" dir="2700000" algn="tl" rotWithShape="0">
+                    <a:schemeClr val="dk1">
+                      <a:alpha val="40000"/>
+                    </a:schemeClr>
+                  </a:outerShdw>
+                </a:effectLst>
+              </a:rPr>
+              <a:t>Find Gain Ratio </a:t>
+            </a:r>
+            <a:r>
+              <a:rPr lang="en-US" sz="3200" dirty="0">
+                <a:ln w="0"/>
+                <a:effectLst>
+                  <a:outerShdw blurRad="38100" dist="19050" dir="2700000" algn="tl" rotWithShape="0">
+                    <a:schemeClr val="dk1">
+                      <a:alpha val="40000"/>
+                    </a:schemeClr>
+                  </a:outerShdw>
+                </a:effectLst>
+              </a:rPr>
+              <a:t>(Humidity):</a:t>
+            </a:r>
+            <a:r>
+              <a:rPr lang="en-US" sz="5400" b="0" cap="none" spc="0" dirty="0">
+                <a:ln w="0"/>
+                <a:solidFill>
+                  <a:schemeClr val="tx1"/>
+                </a:solidFill>
+                <a:effectLst>
+                  <a:outerShdw blurRad="38100" dist="19050" dir="2700000" algn="tl" rotWithShape="0">
+                    <a:schemeClr val="dk1">
+                      <a:alpha val="40000"/>
+                    </a:schemeClr>
+                  </a:outerShdw>
+                </a:effectLst>
+              </a:rPr>
+              <a:t> </a:t>
+            </a:r>
+            <a:r>
+              <a:rPr lang="en-US" sz="3200" b="0" cap="none" spc="0" dirty="0">
+                <a:ln w="0"/>
+                <a:solidFill>
+                  <a:schemeClr val="tx1"/>
+                </a:solidFill>
+                <a:effectLst>
+                  <a:outerShdw blurRad="38100" dist="19050" dir="2700000" algn="tl" rotWithShape="0">
+                    <a:schemeClr val="dk1">
+                      <a:alpha val="40000"/>
+                    </a:schemeClr>
+                  </a:outerShdw>
+                </a:effectLst>
+              </a:rPr>
+              <a:t>Cont..</a:t>
+            </a:r>
+            <a:endParaRPr lang="en-US" sz="5400" b="0" cap="none" spc="0" dirty="0">
+              <a:ln w="0"/>
+              <a:solidFill>
+                <a:schemeClr val="tx1"/>
+              </a:solidFill>
+              <a:effectLst>
+                <a:outerShdw blurRad="38100" dist="19050" dir="2700000" algn="tl" rotWithShape="0">
+                  <a:schemeClr val="dk1">
+                    <a:alpha val="40000"/>
+                  </a:schemeClr>
+                </a:outerShdw>
+              </a:effectLst>
+            </a:endParaRPr>
+          </a:p>
+        </p:txBody>
+      </p:sp>
+      <p:sp>
+        <p:nvSpPr>
+          <p:cNvPr id="3" name="Rectangle 2">
+            <a:extLst>
+              <a:ext uri="{FF2B5EF4-FFF2-40B4-BE49-F238E27FC236}">
+                <a16:creationId xmlns:a16="http://schemas.microsoft.com/office/drawing/2014/main" id="{E6F2142E-9C42-431E-8044-1C7DF53DEA88}"/>
+              </a:ext>
+            </a:extLst>
+          </p:cNvPr>
+          <p:cNvSpPr/>
+          <p:nvPr/>
+        </p:nvSpPr>
+        <p:spPr>
+          <a:xfrm>
+            <a:off x="1038147" y="1309516"/>
+            <a:ext cx="4624984" cy="369332"/>
+          </a:xfrm>
+          <a:prstGeom prst="rect">
+            <a:avLst/>
+          </a:prstGeom>
+        </p:spPr>
+        <p:txBody>
+          <a:bodyPr wrap="none">
+            <a:spAutoFit/>
+          </a:bodyPr>
+          <a:lstStyle/>
+          <a:p>
+            <a:r>
+              <a:rPr lang="en-US" b="1" dirty="0"/>
+              <a:t>Gain Ratio (PG | Humidity &lt;&gt; 68)	 </a:t>
+            </a:r>
+            <a:r>
+              <a:rPr lang="en-US" dirty="0"/>
+              <a:t>= 0.169</a:t>
+            </a:r>
+            <a:endParaRPr lang="en-US" b="1" dirty="0"/>
+          </a:p>
+        </p:txBody>
+      </p:sp>
+      <p:sp>
+        <p:nvSpPr>
+          <p:cNvPr id="4" name="Rectangle 3">
+            <a:extLst>
+              <a:ext uri="{FF2B5EF4-FFF2-40B4-BE49-F238E27FC236}">
+                <a16:creationId xmlns:a16="http://schemas.microsoft.com/office/drawing/2014/main" id="{A67093D6-418D-472E-B010-B5E8A91D7E0C}"/>
+              </a:ext>
+            </a:extLst>
+          </p:cNvPr>
+          <p:cNvSpPr/>
+          <p:nvPr/>
+        </p:nvSpPr>
+        <p:spPr>
+          <a:xfrm>
+            <a:off x="1038147" y="1782186"/>
+            <a:ext cx="4624984" cy="369332"/>
+          </a:xfrm>
+          <a:prstGeom prst="rect">
+            <a:avLst/>
+          </a:prstGeom>
+          <a:solidFill>
+            <a:srgbClr val="FFFF00"/>
+          </a:solidFill>
+        </p:spPr>
+        <p:txBody>
+          <a:bodyPr wrap="none">
+            <a:spAutoFit/>
+          </a:bodyPr>
+          <a:lstStyle/>
+          <a:p>
+            <a:r>
+              <a:rPr lang="en-US" b="1" dirty="0"/>
+              <a:t>Gain Ratio (PG | Humidity &lt;&gt; 70)	 </a:t>
+            </a:r>
+            <a:r>
+              <a:rPr lang="en-US" dirty="0"/>
+              <a:t>= 0.261</a:t>
+            </a:r>
+            <a:endParaRPr lang="en-US" b="1" dirty="0"/>
+          </a:p>
+        </p:txBody>
+      </p:sp>
+      <p:sp>
+        <p:nvSpPr>
+          <p:cNvPr id="5" name="Rectangle 4">
+            <a:extLst>
+              <a:ext uri="{FF2B5EF4-FFF2-40B4-BE49-F238E27FC236}">
+                <a16:creationId xmlns:a16="http://schemas.microsoft.com/office/drawing/2014/main" id="{4DC345E2-95CD-44A1-9529-456DBAD7AD0E}"/>
+              </a:ext>
+            </a:extLst>
+          </p:cNvPr>
+          <p:cNvSpPr/>
+          <p:nvPr/>
+        </p:nvSpPr>
+        <p:spPr>
+          <a:xfrm>
+            <a:off x="1038147" y="2254856"/>
+            <a:ext cx="4624984" cy="369332"/>
+          </a:xfrm>
+          <a:prstGeom prst="rect">
+            <a:avLst/>
+          </a:prstGeom>
+        </p:spPr>
+        <p:txBody>
+          <a:bodyPr wrap="none">
+            <a:spAutoFit/>
+          </a:bodyPr>
+          <a:lstStyle/>
+          <a:p>
+            <a:r>
+              <a:rPr lang="en-US" b="1" dirty="0"/>
+              <a:t>Gain Ratio (PG | Humidity &lt;&gt; 72)	 </a:t>
+            </a:r>
+            <a:r>
+              <a:rPr lang="en-US" dirty="0"/>
+              <a:t>= 0.047</a:t>
+            </a:r>
+            <a:endParaRPr lang="en-US" b="1" dirty="0"/>
+          </a:p>
+        </p:txBody>
+      </p:sp>
+      <p:sp>
+        <p:nvSpPr>
+          <p:cNvPr id="6" name="Rectangle 5">
+            <a:extLst>
+              <a:ext uri="{FF2B5EF4-FFF2-40B4-BE49-F238E27FC236}">
+                <a16:creationId xmlns:a16="http://schemas.microsoft.com/office/drawing/2014/main" id="{5F64DD10-7E20-4C87-BC24-D8B8AB550377}"/>
+              </a:ext>
+            </a:extLst>
+          </p:cNvPr>
+          <p:cNvSpPr/>
+          <p:nvPr/>
+        </p:nvSpPr>
+        <p:spPr>
+          <a:xfrm>
+            <a:off x="1038147" y="2727526"/>
+            <a:ext cx="4624984" cy="369332"/>
+          </a:xfrm>
+          <a:prstGeom prst="rect">
+            <a:avLst/>
+          </a:prstGeom>
+        </p:spPr>
+        <p:txBody>
+          <a:bodyPr wrap="none">
+            <a:spAutoFit/>
+          </a:bodyPr>
+          <a:lstStyle/>
+          <a:p>
+            <a:r>
+              <a:rPr lang="en-US" b="1" dirty="0"/>
+              <a:t>Gain Ratio (PG | Humidity &lt;&gt; 75)	 </a:t>
+            </a:r>
+            <a:r>
+              <a:rPr lang="en-US" dirty="0"/>
+              <a:t>= 0.091</a:t>
+            </a:r>
+            <a:endParaRPr lang="en-US" b="1" dirty="0"/>
+          </a:p>
+        </p:txBody>
+      </p:sp>
+      <p:sp>
+        <p:nvSpPr>
+          <p:cNvPr id="7" name="Rectangle 6">
+            <a:extLst>
+              <a:ext uri="{FF2B5EF4-FFF2-40B4-BE49-F238E27FC236}">
+                <a16:creationId xmlns:a16="http://schemas.microsoft.com/office/drawing/2014/main" id="{E59CAAAF-1204-460D-98CC-D86378A57262}"/>
+              </a:ext>
+            </a:extLst>
+          </p:cNvPr>
+          <p:cNvSpPr/>
+          <p:nvPr/>
+        </p:nvSpPr>
+        <p:spPr>
+          <a:xfrm>
+            <a:off x="1038147" y="3200196"/>
+            <a:ext cx="4624984" cy="369332"/>
+          </a:xfrm>
+          <a:prstGeom prst="rect">
+            <a:avLst/>
+          </a:prstGeom>
+        </p:spPr>
+        <p:txBody>
+          <a:bodyPr wrap="none">
+            <a:spAutoFit/>
+          </a:bodyPr>
+          <a:lstStyle/>
+          <a:p>
+            <a:r>
+              <a:rPr lang="en-US" b="1" dirty="0"/>
+              <a:t>Gain Ratio (PG | Humidity &lt;&gt; 76)	 </a:t>
+            </a:r>
+            <a:r>
+              <a:rPr lang="en-US" dirty="0"/>
+              <a:t>= 0.151</a:t>
+            </a:r>
+            <a:endParaRPr lang="en-US" b="1" dirty="0"/>
+          </a:p>
+        </p:txBody>
+      </p:sp>
+      <p:sp>
+        <p:nvSpPr>
+          <p:cNvPr id="8" name="Rectangle 7">
+            <a:extLst>
+              <a:ext uri="{FF2B5EF4-FFF2-40B4-BE49-F238E27FC236}">
+                <a16:creationId xmlns:a16="http://schemas.microsoft.com/office/drawing/2014/main" id="{6D2A2A68-B4D4-4674-A908-090261496A41}"/>
+              </a:ext>
+            </a:extLst>
+          </p:cNvPr>
+          <p:cNvSpPr/>
+          <p:nvPr/>
+        </p:nvSpPr>
+        <p:spPr>
+          <a:xfrm>
+            <a:off x="1038147" y="3731432"/>
+            <a:ext cx="4624984" cy="369332"/>
+          </a:xfrm>
+          <a:prstGeom prst="rect">
+            <a:avLst/>
+          </a:prstGeom>
+        </p:spPr>
+        <p:txBody>
+          <a:bodyPr wrap="none">
+            <a:spAutoFit/>
+          </a:bodyPr>
+          <a:lstStyle/>
+          <a:p>
+            <a:r>
+              <a:rPr lang="en-US" b="1" dirty="0"/>
+              <a:t>Gain Ratio (PG | Humidity &lt;&gt; 78)	 </a:t>
+            </a:r>
+            <a:r>
+              <a:rPr lang="en-US" dirty="0"/>
+              <a:t>= 0.048</a:t>
+            </a:r>
+            <a:endParaRPr lang="en-US" b="1" dirty="0"/>
+          </a:p>
+        </p:txBody>
+      </p:sp>
+      <p:sp>
+        <p:nvSpPr>
+          <p:cNvPr id="9" name="Rectangle 8">
+            <a:extLst>
+              <a:ext uri="{FF2B5EF4-FFF2-40B4-BE49-F238E27FC236}">
+                <a16:creationId xmlns:a16="http://schemas.microsoft.com/office/drawing/2014/main" id="{589FDE67-D95D-451D-AB76-DDB11F838539}"/>
+              </a:ext>
+            </a:extLst>
+          </p:cNvPr>
+          <p:cNvSpPr/>
+          <p:nvPr/>
+        </p:nvSpPr>
+        <p:spPr>
+          <a:xfrm>
+            <a:off x="1038147" y="4233813"/>
+            <a:ext cx="4624984" cy="369332"/>
+          </a:xfrm>
+          <a:prstGeom prst="rect">
+            <a:avLst/>
+          </a:prstGeom>
+        </p:spPr>
+        <p:txBody>
+          <a:bodyPr wrap="none">
+            <a:spAutoFit/>
+          </a:bodyPr>
+          <a:lstStyle/>
+          <a:p>
+            <a:r>
+              <a:rPr lang="en-US" b="1" dirty="0"/>
+              <a:t>Gain Ratio (PG | Humidity &lt;&gt; 80)	 </a:t>
+            </a:r>
+            <a:r>
+              <a:rPr lang="en-US" dirty="0"/>
+              <a:t>= 0.108</a:t>
+            </a:r>
+            <a:endParaRPr lang="en-US" b="1" dirty="0"/>
+          </a:p>
+        </p:txBody>
+      </p:sp>
+      <p:sp>
+        <p:nvSpPr>
+          <p:cNvPr id="10" name="Rectangle 9">
+            <a:extLst>
+              <a:ext uri="{FF2B5EF4-FFF2-40B4-BE49-F238E27FC236}">
+                <a16:creationId xmlns:a16="http://schemas.microsoft.com/office/drawing/2014/main" id="{25DBFC53-E539-4F7C-A167-09CC44D6AA0E}"/>
+              </a:ext>
+            </a:extLst>
+          </p:cNvPr>
+          <p:cNvSpPr/>
+          <p:nvPr/>
+        </p:nvSpPr>
+        <p:spPr>
+          <a:xfrm>
+            <a:off x="1038147" y="4743238"/>
+            <a:ext cx="4624984" cy="369332"/>
+          </a:xfrm>
+          <a:prstGeom prst="rect">
+            <a:avLst/>
+          </a:prstGeom>
+        </p:spPr>
+        <p:txBody>
+          <a:bodyPr wrap="none">
+            <a:spAutoFit/>
+          </a:bodyPr>
+          <a:lstStyle/>
+          <a:p>
+            <a:r>
+              <a:rPr lang="en-US" b="1" dirty="0"/>
+              <a:t>Gain Ratio (PG | Humidity &lt;&gt; 83)	 </a:t>
+            </a:r>
+            <a:r>
+              <a:rPr lang="en-US" dirty="0"/>
+              <a:t>= 0.028</a:t>
+            </a:r>
+            <a:endParaRPr lang="en-US" b="1" dirty="0"/>
+          </a:p>
+        </p:txBody>
+      </p:sp>
+      <p:sp>
+        <p:nvSpPr>
+          <p:cNvPr id="12" name="Rectangle 11">
+            <a:extLst>
+              <a:ext uri="{FF2B5EF4-FFF2-40B4-BE49-F238E27FC236}">
+                <a16:creationId xmlns:a16="http://schemas.microsoft.com/office/drawing/2014/main" id="{1BCC4C0D-FC10-41CD-B8AB-92383441106D}"/>
+              </a:ext>
+            </a:extLst>
+          </p:cNvPr>
+          <p:cNvSpPr/>
+          <p:nvPr/>
+        </p:nvSpPr>
+        <p:spPr>
+          <a:xfrm>
+            <a:off x="5601374" y="1309516"/>
+            <a:ext cx="4624984" cy="369332"/>
+          </a:xfrm>
+          <a:prstGeom prst="rect">
+            <a:avLst/>
+          </a:prstGeom>
+        </p:spPr>
+        <p:txBody>
+          <a:bodyPr wrap="none">
+            <a:spAutoFit/>
+          </a:bodyPr>
+          <a:lstStyle/>
+          <a:p>
+            <a:r>
+              <a:rPr lang="en-US" b="1" dirty="0"/>
+              <a:t>Gain Ratio (PG | Humidity &lt;&gt; 86)	 </a:t>
+            </a:r>
+            <a:r>
+              <a:rPr lang="en-US" dirty="0"/>
+              <a:t>= 0.169</a:t>
+            </a:r>
+            <a:endParaRPr lang="en-US" b="1" dirty="0"/>
+          </a:p>
+        </p:txBody>
+      </p:sp>
+      <p:sp>
+        <p:nvSpPr>
+          <p:cNvPr id="13" name="Rectangle 12">
+            <a:extLst>
+              <a:ext uri="{FF2B5EF4-FFF2-40B4-BE49-F238E27FC236}">
+                <a16:creationId xmlns:a16="http://schemas.microsoft.com/office/drawing/2014/main" id="{EDBF926A-B274-483E-8B9E-2035F11F1935}"/>
+              </a:ext>
+            </a:extLst>
+          </p:cNvPr>
+          <p:cNvSpPr/>
+          <p:nvPr/>
+        </p:nvSpPr>
+        <p:spPr>
+          <a:xfrm>
+            <a:off x="5601374" y="1782186"/>
+            <a:ext cx="4624984" cy="369332"/>
+          </a:xfrm>
+          <a:prstGeom prst="rect">
+            <a:avLst/>
+          </a:prstGeom>
+        </p:spPr>
+        <p:txBody>
+          <a:bodyPr wrap="none">
+            <a:spAutoFit/>
+          </a:bodyPr>
+          <a:lstStyle/>
+          <a:p>
+            <a:r>
+              <a:rPr lang="en-US" b="1" dirty="0"/>
+              <a:t>Gain Ratio (PG | Humidity &lt;&gt; 90)	 </a:t>
+            </a:r>
+            <a:r>
+              <a:rPr lang="en-US" dirty="0"/>
+              <a:t>= 0.127</a:t>
+            </a:r>
+            <a:endParaRPr lang="en-US" b="1" dirty="0"/>
+          </a:p>
+        </p:txBody>
+      </p:sp>
+      <p:sp>
+        <p:nvSpPr>
+          <p:cNvPr id="14" name="Rectangle 13">
+            <a:extLst>
+              <a:ext uri="{FF2B5EF4-FFF2-40B4-BE49-F238E27FC236}">
+                <a16:creationId xmlns:a16="http://schemas.microsoft.com/office/drawing/2014/main" id="{B389C89D-8B17-4783-80DA-96B797E086FF}"/>
+              </a:ext>
+            </a:extLst>
+          </p:cNvPr>
+          <p:cNvSpPr/>
+          <p:nvPr/>
+        </p:nvSpPr>
+        <p:spPr>
+          <a:xfrm>
+            <a:off x="5601374" y="2254856"/>
+            <a:ext cx="6422912" cy="369332"/>
+          </a:xfrm>
+          <a:prstGeom prst="rect">
+            <a:avLst/>
+          </a:prstGeom>
+        </p:spPr>
+        <p:txBody>
+          <a:bodyPr wrap="none">
+            <a:spAutoFit/>
+          </a:bodyPr>
+          <a:lstStyle/>
+          <a:p>
+            <a:r>
+              <a:rPr lang="en-US" b="1" dirty="0"/>
+              <a:t>Note: </a:t>
+            </a:r>
+            <a:r>
+              <a:rPr lang="en-US" dirty="0"/>
+              <a:t>90 we are not going to consider since it is the Threshold limit</a:t>
+            </a:r>
+            <a:endParaRPr lang="en-US" b="1" dirty="0"/>
+          </a:p>
+        </p:txBody>
+      </p:sp>
+      <p:sp>
+        <p:nvSpPr>
+          <p:cNvPr id="16" name="Rectangle 15">
+            <a:extLst>
+              <a:ext uri="{FF2B5EF4-FFF2-40B4-BE49-F238E27FC236}">
+                <a16:creationId xmlns:a16="http://schemas.microsoft.com/office/drawing/2014/main" id="{B25D8B5D-7DC1-4B19-901D-330C12C30269}"/>
+              </a:ext>
+            </a:extLst>
+          </p:cNvPr>
+          <p:cNvSpPr/>
+          <p:nvPr/>
+        </p:nvSpPr>
+        <p:spPr>
+          <a:xfrm>
+            <a:off x="1038147" y="5252663"/>
+            <a:ext cx="4624984" cy="369332"/>
+          </a:xfrm>
+          <a:prstGeom prst="rect">
+            <a:avLst/>
+          </a:prstGeom>
+        </p:spPr>
+        <p:txBody>
+          <a:bodyPr wrap="none">
+            <a:spAutoFit/>
+          </a:bodyPr>
+          <a:lstStyle/>
+          <a:p>
+            <a:r>
+              <a:rPr lang="en-US" b="1" dirty="0"/>
+              <a:t>Gain Ratio (PG | Humidity &lt;&gt; 85)	 </a:t>
+            </a:r>
+            <a:r>
+              <a:rPr lang="en-US" dirty="0"/>
+              <a:t>= 0.002</a:t>
+            </a:r>
+            <a:endParaRPr lang="en-US" b="1" dirty="0"/>
+          </a:p>
+        </p:txBody>
+      </p:sp>
+    </p:spTree>
+    <p:extLst>
+      <p:ext uri="{BB962C8B-B14F-4D97-AF65-F5344CB8AC3E}">
+        <p14:creationId xmlns:p14="http://schemas.microsoft.com/office/powerpoint/2010/main" val="357096793"/>
+      </p:ext>
+    </p:extLst>
+  </p:cSld>
+  <p:clrMapOvr>
+    <a:masterClrMapping/>
+  </p:clrMapOvr>
+</p:sld>
+</file>
+
+<file path=ppt/slides/slide11.xml><?xml version="1.0" encoding="utf-8"?>
+<p:sld xmlns:a="http://schemas.openxmlformats.org/drawingml/2006/main" xmlns:r="http://schemas.openxmlformats.org/officeDocument/2006/relationships" xmlns:p="http://schemas.openxmlformats.org/presentationml/2006/main">
+  <p:cSld>
+    <p:spTree>
+      <p:nvGrpSpPr>
+        <p:cNvPr id="1" name=""/>
+        <p:cNvGrpSpPr/>
+        <p:nvPr/>
+      </p:nvGrpSpPr>
+      <p:grpSpPr>
+        <a:xfrm>
+          <a:off x="0" y="0"/>
+          <a:ext cx="0" cy="0"/>
+          <a:chOff x="0" y="0"/>
+          <a:chExt cx="0" cy="0"/>
+        </a:xfrm>
+      </p:grpSpPr>
       <p:graphicFrame>
         <p:nvGraphicFramePr>
           <p:cNvPr id="2" name="Table 1">
@@ -3709,7 +4322,7 @@
                     <a:p>
                       <a:pPr algn="l" fontAlgn="ctr"/>
                       <a:r>
-                        <a:rPr lang="en-US" sz="900" b="1" i="0" u="none" strike="noStrike">
+                        <a:rPr lang="en-US" sz="900" b="1" i="0" u="none" strike="noStrike" dirty="0">
                           <a:solidFill>
                             <a:srgbClr val="24292E"/>
                           </a:solidFill>
@@ -5706,7 +6319,7 @@
 </p:sld>
 </file>
 
-<file path=ppt/slides/slide11.xml><?xml version="1.0" encoding="utf-8"?>
+<file path=ppt/slides/slide12.xml><?xml version="1.0" encoding="utf-8"?>
 <p:sld xmlns:a="http://schemas.openxmlformats.org/drawingml/2006/main" xmlns:r="http://schemas.openxmlformats.org/officeDocument/2006/relationships" xmlns:p="http://schemas.openxmlformats.org/presentationml/2006/main">
   <p:cSld>
     <p:spTree>
@@ -7575,8 +8188,8 @@
         </p:nvSpPr>
         <p:spPr>
           <a:xfrm>
-            <a:off x="3915175" y="1297936"/>
-            <a:ext cx="3464417" cy="579550"/>
+            <a:off x="3400020" y="1297936"/>
+            <a:ext cx="4494727" cy="579550"/>
           </a:xfrm>
           <a:prstGeom prst="roundRect">
             <a:avLst/>
@@ -7630,7 +8243,7 @@
                   </a:outerShdw>
                 </a:effectLst>
               </a:rPr>
-              <a:t>Find “Entropy” and “Split Info” of Each Input Attribute</a:t>
+              <a:t>Find “Information Gain” and “Split Info” of Each Input Attribute</a:t>
             </a:r>
           </a:p>
         </p:txBody>
@@ -7797,8 +8410,8 @@
         </p:nvSpPr>
         <p:spPr>
           <a:xfrm>
-            <a:off x="4185631" y="4237149"/>
-            <a:ext cx="2923506" cy="579550"/>
+            <a:off x="3812146" y="4237149"/>
+            <a:ext cx="3670479" cy="579550"/>
           </a:xfrm>
           <a:prstGeom prst="roundRect">
             <a:avLst/>
@@ -7917,7 +8530,7 @@
                   </a:outerShdw>
                 </a:effectLst>
               </a:rPr>
-              <a:t>Gain Ratio = MAX(Gain Ration)</a:t>
+              <a:t>IF Entropy = 0</a:t>
             </a:r>
           </a:p>
         </p:txBody>
@@ -8125,6 +8738,7 @@
             </a:extLst>
           </p:cNvPr>
           <p:cNvCxnSpPr>
+            <a:cxnSpLocks/>
             <a:stCxn id="5" idx="2"/>
             <a:endCxn id="6" idx="0"/>
           </p:cNvCxnSpPr>
@@ -8133,7 +8747,7 @@
         <p:spPr>
           <a:xfrm>
             <a:off x="5647384" y="3932349"/>
-            <a:ext cx="0" cy="304800"/>
+            <a:ext cx="2" cy="304800"/>
           </a:xfrm>
           <a:prstGeom prst="straightConnector1">
             <a:avLst/>
@@ -8176,7 +8790,7 @@
         <p:spPr>
           <a:xfrm flipH="1">
             <a:off x="5647383" y="4816699"/>
-            <a:ext cx="1" cy="296213"/>
+            <a:ext cx="3" cy="296213"/>
           </a:xfrm>
           <a:prstGeom prst="straightConnector1">
             <a:avLst/>
@@ -8262,11 +8876,11 @@
         <p:spPr>
           <a:xfrm flipV="1">
             <a:off x="6931942" y="1587711"/>
-            <a:ext cx="447650" cy="4136948"/>
+            <a:ext cx="962805" cy="4136948"/>
           </a:xfrm>
           <a:prstGeom prst="bentConnector3">
             <a:avLst>
-              <a:gd name="adj1" fmla="val 398489"/>
+              <a:gd name="adj1" fmla="val 190625"/>
             </a:avLst>
           </a:prstGeom>
           <a:ln>
@@ -9234,7 +9848,7 @@
                   </a:outerShdw>
                 </a:effectLst>
               </a:rPr>
-              <a:t>Split Ratio Formula:</a:t>
+              <a:t>Split Info Formula:</a:t>
             </a:r>
           </a:p>
         </p:txBody>
@@ -11730,6 +12344,370 @@
           </a:prstGeom>
         </p:spPr>
       </p:pic>
+      <p:sp>
+        <p:nvSpPr>
+          <p:cNvPr id="5" name="TextBox 4">
+            <a:extLst>
+              <a:ext uri="{FF2B5EF4-FFF2-40B4-BE49-F238E27FC236}">
+                <a16:creationId xmlns:a16="http://schemas.microsoft.com/office/drawing/2014/main" id="{65BFE452-58A4-43E3-9BC1-1EA724927A2E}"/>
+              </a:ext>
+            </a:extLst>
+          </p:cNvPr>
+          <p:cNvSpPr txBox="1"/>
+          <p:nvPr/>
+        </p:nvSpPr>
+        <p:spPr>
+          <a:xfrm>
+            <a:off x="3261619" y="1272080"/>
+            <a:ext cx="8976575" cy="4185761"/>
+          </a:xfrm>
+          <a:prstGeom prst="rect">
+            <a:avLst/>
+          </a:prstGeom>
+          <a:noFill/>
+        </p:spPr>
+        <p:txBody>
+          <a:bodyPr wrap="square" rtlCol="0">
+            <a:spAutoFit/>
+          </a:bodyPr>
+          <a:lstStyle/>
+          <a:p>
+            <a:r>
+              <a:rPr lang="en-US" b="1" dirty="0"/>
+              <a:t>Entropy (PG | Humidity &lt;= 65)</a:t>
+            </a:r>
+            <a:r>
+              <a:rPr lang="en-US" dirty="0"/>
+              <a:t> 	= -P(No) * log</a:t>
+            </a:r>
+            <a:r>
+              <a:rPr lang="en-US" baseline="-25000" dirty="0"/>
+              <a:t>2 </a:t>
+            </a:r>
+            <a:r>
+              <a:rPr lang="en-US" dirty="0"/>
+              <a:t>(No) –P(Yes) * log</a:t>
+            </a:r>
+            <a:r>
+              <a:rPr lang="en-US" baseline="-25000" dirty="0"/>
+              <a:t>2 </a:t>
+            </a:r>
+            <a:r>
+              <a:rPr lang="en-US" dirty="0"/>
+              <a:t>(Yes)</a:t>
+            </a:r>
+          </a:p>
+          <a:p>
+            <a:r>
+              <a:rPr lang="en-US" dirty="0"/>
+              <a:t>				= -(0/1)* log</a:t>
+            </a:r>
+            <a:r>
+              <a:rPr lang="en-US" baseline="-25000" dirty="0"/>
+              <a:t>2</a:t>
+            </a:r>
+            <a:r>
+              <a:rPr lang="en-US" dirty="0"/>
+              <a:t>(0/1) - (1/1) * log</a:t>
+            </a:r>
+            <a:r>
+              <a:rPr lang="en-US" baseline="-25000" dirty="0"/>
+              <a:t>2</a:t>
+            </a:r>
+            <a:r>
+              <a:rPr lang="en-US" dirty="0"/>
+              <a:t>(1/1)</a:t>
+            </a:r>
+          </a:p>
+          <a:p>
+            <a:r>
+              <a:rPr lang="en-US" dirty="0"/>
+              <a:t>				= 0 </a:t>
+            </a:r>
+          </a:p>
+          <a:p>
+            <a:r>
+              <a:rPr lang="en-US" b="1" dirty="0"/>
+              <a:t>	</a:t>
+            </a:r>
+            <a:r>
+              <a:rPr lang="en-US" b="1" dirty="0" err="1"/>
+              <a:t>ie</a:t>
+            </a:r>
+            <a:r>
+              <a:rPr lang="en-US" b="1" dirty="0"/>
+              <a:t>: </a:t>
+            </a:r>
+            <a:r>
+              <a:rPr lang="en-US" sz="1600" dirty="0"/>
+              <a:t>if all the values belongs to same class then entropy will be Zero.</a:t>
+            </a:r>
+          </a:p>
+          <a:p>
+            <a:endParaRPr lang="en-US" sz="1600" b="1" dirty="0"/>
+          </a:p>
+          <a:p>
+            <a:r>
+              <a:rPr lang="en-US" b="1" dirty="0"/>
+              <a:t>Entropy (PG | Humidity &gt; 65)		</a:t>
+            </a:r>
+            <a:r>
+              <a:rPr lang="en-US" dirty="0"/>
+              <a:t>=</a:t>
+            </a:r>
+            <a:r>
+              <a:rPr lang="en-US" b="1" dirty="0"/>
+              <a:t> </a:t>
+            </a:r>
+            <a:r>
+              <a:rPr lang="en-US" dirty="0"/>
+              <a:t>-(5/13).log</a:t>
+            </a:r>
+            <a:r>
+              <a:rPr lang="en-US" baseline="-25000" dirty="0"/>
+              <a:t>2</a:t>
+            </a:r>
+            <a:r>
+              <a:rPr lang="en-US" dirty="0"/>
+              <a:t>(5/13) – (8/13).log</a:t>
+            </a:r>
+            <a:r>
+              <a:rPr lang="en-US" baseline="-25000" dirty="0"/>
+              <a:t>2</a:t>
+            </a:r>
+            <a:r>
+              <a:rPr lang="en-US" dirty="0"/>
+              <a:t>(8/13)</a:t>
+            </a:r>
+          </a:p>
+          <a:p>
+            <a:r>
+              <a:rPr lang="en-US" b="1" dirty="0"/>
+              <a:t>				</a:t>
+            </a:r>
+            <a:r>
+              <a:rPr lang="en-US" dirty="0"/>
+              <a:t>= 0.530 + 0.431</a:t>
+            </a:r>
+          </a:p>
+          <a:p>
+            <a:r>
+              <a:rPr lang="en-US" b="1" dirty="0"/>
+              <a:t>				</a:t>
+            </a:r>
+            <a:r>
+              <a:rPr lang="en-US" dirty="0"/>
+              <a:t>= 0.961</a:t>
+            </a:r>
+          </a:p>
+          <a:p>
+            <a:r>
+              <a:rPr lang="en-US" b="1" dirty="0"/>
+              <a:t>Gain(PG | Humidity &lt;&gt; 65)		</a:t>
+            </a:r>
+            <a:r>
+              <a:rPr lang="en-US" dirty="0"/>
+              <a:t>= 0.94 – (1/14) * 0 – (13/14) * 0.961</a:t>
+            </a:r>
+          </a:p>
+          <a:p>
+            <a:r>
+              <a:rPr lang="en-US" b="1" dirty="0"/>
+              <a:t>				</a:t>
+            </a:r>
+            <a:r>
+              <a:rPr lang="en-US" dirty="0"/>
+              <a:t>= 0.048</a:t>
+            </a:r>
+          </a:p>
+          <a:p>
+            <a:endParaRPr lang="en-US" b="1" dirty="0"/>
+          </a:p>
+          <a:p>
+            <a:r>
+              <a:rPr lang="en-US" b="1" dirty="0"/>
+              <a:t>Split Info(PG | Humidity &lt;&gt; 65)	</a:t>
+            </a:r>
+            <a:r>
+              <a:rPr lang="en-US" dirty="0"/>
+              <a:t>= – (1/14) * log</a:t>
+            </a:r>
+            <a:r>
+              <a:rPr lang="en-US" baseline="-25000" dirty="0"/>
+              <a:t>2 </a:t>
+            </a:r>
+            <a:r>
+              <a:rPr lang="en-US" dirty="0"/>
+              <a:t>(1/14)  – (13/14) * log</a:t>
+            </a:r>
+            <a:r>
+              <a:rPr lang="en-US" baseline="-25000" dirty="0"/>
+              <a:t>2 </a:t>
+            </a:r>
+            <a:r>
+              <a:rPr lang="en-US" dirty="0"/>
+              <a:t>(13/14)</a:t>
+            </a:r>
+          </a:p>
+          <a:p>
+            <a:r>
+              <a:rPr lang="en-US" dirty="0"/>
+              <a:t>				= 0.371</a:t>
+            </a:r>
+          </a:p>
+          <a:p>
+            <a:endParaRPr lang="en-US" dirty="0"/>
+          </a:p>
+          <a:p>
+            <a:r>
+              <a:rPr lang="en-US" b="1" dirty="0"/>
+              <a:t>Gain Ratio (PG | Humidity &lt;&gt; 65)	 </a:t>
+            </a:r>
+            <a:r>
+              <a:rPr lang="en-US" dirty="0"/>
+              <a:t>= </a:t>
+            </a:r>
+            <a:r>
+              <a:rPr lang="en-US" dirty="0">
+                <a:highlight>
+                  <a:srgbClr val="FFFF00"/>
+                </a:highlight>
+              </a:rPr>
+              <a:t>0.128</a:t>
+            </a:r>
+            <a:endParaRPr lang="en-US" b="1" dirty="0">
+              <a:highlight>
+                <a:srgbClr val="FFFF00"/>
+              </a:highlight>
+            </a:endParaRPr>
+          </a:p>
+        </p:txBody>
+      </p:sp>
+      <p:sp>
+        <p:nvSpPr>
+          <p:cNvPr id="6" name="Rectangle 5">
+            <a:extLst>
+              <a:ext uri="{FF2B5EF4-FFF2-40B4-BE49-F238E27FC236}">
+                <a16:creationId xmlns:a16="http://schemas.microsoft.com/office/drawing/2014/main" id="{85BA8812-0787-4309-8B17-91C73CE63FA5}"/>
+              </a:ext>
+            </a:extLst>
+          </p:cNvPr>
+          <p:cNvSpPr/>
+          <p:nvPr/>
+        </p:nvSpPr>
+        <p:spPr>
+          <a:xfrm>
+            <a:off x="3305719" y="5003393"/>
+            <a:ext cx="4569653" cy="454448"/>
+          </a:xfrm>
+          <a:prstGeom prst="rect">
+            <a:avLst/>
+          </a:prstGeom>
+          <a:noFill/>
+          <a:ln w="9525" cap="flat" cmpd="sng" algn="ctr">
+            <a:solidFill>
+              <a:schemeClr val="dk1"/>
+            </a:solidFill>
+            <a:prstDash val="solid"/>
+            <a:round/>
+            <a:headEnd type="none" w="med" len="med"/>
+            <a:tailEnd type="none" w="med" len="med"/>
+          </a:ln>
+        </p:spPr>
+        <p:style>
+          <a:lnRef idx="0">
+            <a:scrgbClr r="0" g="0" b="0"/>
+          </a:lnRef>
+          <a:fillRef idx="0">
+            <a:scrgbClr r="0" g="0" b="0"/>
+          </a:fillRef>
+          <a:effectRef idx="0">
+            <a:scrgbClr r="0" g="0" b="0"/>
+          </a:effectRef>
+          <a:fontRef idx="minor">
+            <a:schemeClr val="dk1"/>
+          </a:fontRef>
+        </p:style>
+        <p:txBody>
+          <a:bodyPr rtlCol="0" anchor="ctr"/>
+          <a:lstStyle/>
+          <a:p>
+            <a:pPr algn="ctr"/>
+            <a:endParaRPr lang="en-US"/>
+          </a:p>
+        </p:txBody>
+      </p:sp>
+      <p:sp>
+        <p:nvSpPr>
+          <p:cNvPr id="7" name="Rectangle 6">
+            <a:extLst>
+              <a:ext uri="{FF2B5EF4-FFF2-40B4-BE49-F238E27FC236}">
+                <a16:creationId xmlns:a16="http://schemas.microsoft.com/office/drawing/2014/main" id="{04A5BB9F-54BC-4870-AB14-5B7E724E5AD3}"/>
+              </a:ext>
+            </a:extLst>
+          </p:cNvPr>
+          <p:cNvSpPr/>
+          <p:nvPr/>
+        </p:nvSpPr>
+        <p:spPr>
+          <a:xfrm>
+            <a:off x="3348565" y="5701249"/>
+            <a:ext cx="8052525" cy="400110"/>
+          </a:xfrm>
+          <a:prstGeom prst="rect">
+            <a:avLst/>
+          </a:prstGeom>
+          <a:noFill/>
+        </p:spPr>
+        <p:txBody>
+          <a:bodyPr wrap="none" lIns="91440" tIns="45720" rIns="91440" bIns="45720">
+            <a:spAutoFit/>
+          </a:bodyPr>
+          <a:lstStyle/>
+          <a:p>
+            <a:pPr algn="ctr"/>
+            <a:r>
+              <a:rPr lang="en-US" sz="2000" b="1" dirty="0">
+                <a:ln w="0"/>
+                <a:effectLst>
+                  <a:outerShdw blurRad="38100" dist="19050" dir="2700000" algn="tl" rotWithShape="0">
+                    <a:schemeClr val="dk1">
+                      <a:alpha val="40000"/>
+                    </a:schemeClr>
+                  </a:outerShdw>
+                </a:effectLst>
+              </a:rPr>
+              <a:t>Note:</a:t>
+            </a:r>
+            <a:r>
+              <a:rPr lang="en-US" sz="2000" dirty="0">
+                <a:ln w="0"/>
+                <a:effectLst>
+                  <a:outerShdw blurRad="38100" dist="19050" dir="2700000" algn="tl" rotWithShape="0">
+                    <a:schemeClr val="dk1">
+                      <a:alpha val="40000"/>
+                    </a:schemeClr>
+                  </a:outerShdw>
+                </a:effectLst>
+              </a:rPr>
+              <a:t> We have to find the same for all the remaining Values in the Attribute</a:t>
+            </a:r>
+            <a:endParaRPr lang="en-US" sz="2000" b="0" cap="none" spc="0" dirty="0">
+              <a:ln w="0"/>
+              <a:solidFill>
+                <a:schemeClr val="tx1"/>
+              </a:solidFill>
+              <a:effectLst>
+                <a:outerShdw blurRad="38100" dist="19050" dir="2700000" algn="tl" rotWithShape="0">
+                  <a:schemeClr val="dk1">
+                    <a:alpha val="40000"/>
+                  </a:schemeClr>
+                </a:outerShdw>
+              </a:effectLst>
+            </a:endParaRPr>
+          </a:p>
+        </p:txBody>
+      </p:sp>
     </p:spTree>
     <p:extLst>
       <p:ext uri="{BB962C8B-B14F-4D97-AF65-F5344CB8AC3E}">

</xml_diff>